<commit_message>
3rd 4th Class PPT
</commit_message>
<xml_diff>
--- a/002Introduction to css.pptx
+++ b/002Introduction to css.pptx
@@ -4809,7 +4809,7 @@
         </p:nvSpPr>
         <p:spPr bwMode="auto">
           <a:xfrm>
-            <a:off x="782166" y="1769591"/>
+            <a:off x="782165" y="1769591"/>
             <a:ext cx="10515600" cy="4351338"/>
           </a:xfrm>
         </p:spPr>
@@ -5108,7 +5108,7 @@
         </p:nvSpPr>
         <p:spPr bwMode="auto">
           <a:xfrm>
-            <a:off x="782166" y="1769591"/>
+            <a:off x="782165" y="1769591"/>
             <a:ext cx="10515600" cy="4351338"/>
           </a:xfrm>
         </p:spPr>
@@ -5563,7 +5563,7 @@
         </p:nvSpPr>
         <p:spPr bwMode="auto">
           <a:xfrm>
-            <a:off x="782166" y="1769591"/>
+            <a:off x="782165" y="1769591"/>
             <a:ext cx="10515600" cy="4351338"/>
           </a:xfrm>
         </p:spPr>
@@ -6019,7 +6019,7 @@
         </p:nvSpPr>
         <p:spPr bwMode="auto">
           <a:xfrm>
-            <a:off x="782166" y="1769591"/>
+            <a:off x="782165" y="1769591"/>
             <a:ext cx="10515600" cy="4351338"/>
           </a:xfrm>
         </p:spPr>
@@ -6329,7 +6329,7 @@
         </p:nvSpPr>
         <p:spPr bwMode="auto">
           <a:xfrm>
-            <a:off x="782166" y="1769591"/>
+            <a:off x="782165" y="1769591"/>
             <a:ext cx="10515600" cy="4351338"/>
           </a:xfrm>
         </p:spPr>
@@ -6642,7 +6642,7 @@
         </p:nvSpPr>
         <p:spPr bwMode="auto">
           <a:xfrm>
-            <a:off x="782166" y="1769591"/>
+            <a:off x="782165" y="1769591"/>
             <a:ext cx="10515600" cy="4351338"/>
           </a:xfrm>
         </p:spPr>
@@ -6969,7 +6969,7 @@
         </p:nvSpPr>
         <p:spPr bwMode="auto">
           <a:xfrm>
-            <a:off x="782166" y="1769591"/>
+            <a:off x="782165" y="1769591"/>
             <a:ext cx="10515600" cy="4351338"/>
           </a:xfrm>
         </p:spPr>
@@ -7267,7 +7267,7 @@
         </p:nvSpPr>
         <p:spPr bwMode="auto">
           <a:xfrm>
-            <a:off x="782166" y="1769591"/>
+            <a:off x="782165" y="1769591"/>
             <a:ext cx="10515600" cy="4351338"/>
           </a:xfrm>
         </p:spPr>

</xml_diff>